<commit_message>
Fix figures in evaluation
</commit_message>
<xml_diff>
--- a/ICESS2017/figure/ComparisonOfDynamicConnection.pptx
+++ b/ICESS2017/figure/ComparisonOfDynamicConnection.pptx
@@ -197,7 +197,7 @@
           <a:p>
             <a:fld id="{00D06802-B8EF-4FD8-9511-F1F928CF3A55}" type="datetimeFigureOut">
               <a:rPr kumimoji="1" lang="ja-JP" altLang="en-US" smtClean="0"/>
-              <a:t>2017/2/7</a:t>
+              <a:t>2017/4/7</a:t>
             </a:fld>
             <a:endParaRPr kumimoji="1" lang="ja-JP" altLang="en-US"/>
           </a:p>
@@ -628,7 +628,7 @@
           <a:p>
             <a:fld id="{AA641DB4-C951-4763-94FC-F650C3AA7E65}" type="datetimeFigureOut">
               <a:rPr kumimoji="1" lang="ja-JP" altLang="en-US" smtClean="0"/>
-              <a:t>2017/2/7</a:t>
+              <a:t>2017/4/7</a:t>
             </a:fld>
             <a:endParaRPr kumimoji="1" lang="ja-JP" altLang="en-US"/>
           </a:p>
@@ -830,7 +830,7 @@
           <a:p>
             <a:fld id="{AA641DB4-C951-4763-94FC-F650C3AA7E65}" type="datetimeFigureOut">
               <a:rPr kumimoji="1" lang="ja-JP" altLang="en-US" smtClean="0"/>
-              <a:t>2017/2/7</a:t>
+              <a:t>2017/4/7</a:t>
             </a:fld>
             <a:endParaRPr kumimoji="1" lang="ja-JP" altLang="en-US"/>
           </a:p>
@@ -1042,7 +1042,7 @@
           <a:p>
             <a:fld id="{AA641DB4-C951-4763-94FC-F650C3AA7E65}" type="datetimeFigureOut">
               <a:rPr kumimoji="1" lang="ja-JP" altLang="en-US" smtClean="0"/>
-              <a:t>2017/2/7</a:t>
+              <a:t>2017/4/7</a:t>
             </a:fld>
             <a:endParaRPr kumimoji="1" lang="ja-JP" altLang="en-US"/>
           </a:p>
@@ -1244,7 +1244,7 @@
           <a:p>
             <a:fld id="{AA641DB4-C951-4763-94FC-F650C3AA7E65}" type="datetimeFigureOut">
               <a:rPr kumimoji="1" lang="ja-JP" altLang="en-US" smtClean="0"/>
-              <a:t>2017/2/7</a:t>
+              <a:t>2017/4/7</a:t>
             </a:fld>
             <a:endParaRPr kumimoji="1" lang="ja-JP" altLang="en-US"/>
           </a:p>
@@ -1490,7 +1490,7 @@
           <a:p>
             <a:fld id="{AA641DB4-C951-4763-94FC-F650C3AA7E65}" type="datetimeFigureOut">
               <a:rPr kumimoji="1" lang="ja-JP" altLang="en-US" smtClean="0"/>
-              <a:t>2017/2/7</a:t>
+              <a:t>2017/4/7</a:t>
             </a:fld>
             <a:endParaRPr kumimoji="1" lang="ja-JP" altLang="en-US"/>
           </a:p>
@@ -1786,7 +1786,7 @@
           <a:p>
             <a:fld id="{AA641DB4-C951-4763-94FC-F650C3AA7E65}" type="datetimeFigureOut">
               <a:rPr kumimoji="1" lang="ja-JP" altLang="en-US" smtClean="0"/>
-              <a:t>2017/2/7</a:t>
+              <a:t>2017/4/7</a:t>
             </a:fld>
             <a:endParaRPr kumimoji="1" lang="ja-JP" altLang="en-US"/>
           </a:p>
@@ -2217,7 +2217,7 @@
           <a:p>
             <a:fld id="{AA641DB4-C951-4763-94FC-F650C3AA7E65}" type="datetimeFigureOut">
               <a:rPr kumimoji="1" lang="ja-JP" altLang="en-US" smtClean="0"/>
-              <a:t>2017/2/7</a:t>
+              <a:t>2017/4/7</a:t>
             </a:fld>
             <a:endParaRPr kumimoji="1" lang="ja-JP" altLang="en-US"/>
           </a:p>
@@ -2335,7 +2335,7 @@
           <a:p>
             <a:fld id="{AA641DB4-C951-4763-94FC-F650C3AA7E65}" type="datetimeFigureOut">
               <a:rPr kumimoji="1" lang="ja-JP" altLang="en-US" smtClean="0"/>
-              <a:t>2017/2/7</a:t>
+              <a:t>2017/4/7</a:t>
             </a:fld>
             <a:endParaRPr kumimoji="1" lang="ja-JP" altLang="en-US"/>
           </a:p>
@@ -2430,7 +2430,7 @@
           <a:p>
             <a:fld id="{AA641DB4-C951-4763-94FC-F650C3AA7E65}" type="datetimeFigureOut">
               <a:rPr kumimoji="1" lang="ja-JP" altLang="en-US" smtClean="0"/>
-              <a:t>2017/2/7</a:t>
+              <a:t>2017/4/7</a:t>
             </a:fld>
             <a:endParaRPr kumimoji="1" lang="ja-JP" altLang="en-US"/>
           </a:p>
@@ -2739,7 +2739,7 @@
           <a:p>
             <a:fld id="{AA641DB4-C951-4763-94FC-F650C3AA7E65}" type="datetimeFigureOut">
               <a:rPr kumimoji="1" lang="ja-JP" altLang="en-US" smtClean="0"/>
-              <a:t>2017/2/7</a:t>
+              <a:t>2017/4/7</a:t>
             </a:fld>
             <a:endParaRPr kumimoji="1" lang="ja-JP" altLang="en-US"/>
           </a:p>
@@ -2992,7 +2992,7 @@
           <a:p>
             <a:fld id="{AA641DB4-C951-4763-94FC-F650C3AA7E65}" type="datetimeFigureOut">
               <a:rPr kumimoji="1" lang="ja-JP" altLang="en-US" smtClean="0"/>
-              <a:t>2017/2/7</a:t>
+              <a:t>2017/4/7</a:t>
             </a:fld>
             <a:endParaRPr kumimoji="1" lang="ja-JP" altLang="en-US"/>
           </a:p>
@@ -3237,7 +3237,7 @@
           <a:p>
             <a:fld id="{AA641DB4-C951-4763-94FC-F650C3AA7E65}" type="datetimeFigureOut">
               <a:rPr kumimoji="1" lang="ja-JP" altLang="en-US" smtClean="0"/>
-              <a:t>2017/2/7</a:t>
+              <a:t>2017/4/7</a:t>
             </a:fld>
             <a:endParaRPr kumimoji="1" lang="ja-JP" altLang="en-US"/>
           </a:p>
@@ -4425,7 +4425,7 @@
                     </a:spcBef>
                   </a:pPr>
                   <a:r>
-                    <a:rPr lang="en-US" altLang="ja-JP" dirty="0">
+                    <a:rPr lang="en-US" altLang="ja-JP" dirty="0" smtClean="0">
                       <a:solidFill>
                         <a:schemeClr val="tx1"/>
                       </a:solidFill>
@@ -4433,8 +4433,16 @@
                       <a:ea typeface="メイリオ" panose="020B0604030504040204" pitchFamily="50" charset="-128"/>
                       <a:cs typeface="メイリオ" pitchFamily="50" charset="-128"/>
                     </a:rPr>
-                    <a:t>REP_000</a:t>
+                    <a:t>REP_002</a:t>
                   </a:r>
+                  <a:endParaRPr lang="en-US" altLang="ja-JP" dirty="0">
+                    <a:solidFill>
+                      <a:schemeClr val="tx1"/>
+                    </a:solidFill>
+                    <a:latin typeface="メイリオ" panose="020B0604030504040204" pitchFamily="50" charset="-128"/>
+                    <a:ea typeface="メイリオ" panose="020B0604030504040204" pitchFamily="50" charset="-128"/>
+                    <a:cs typeface="メイリオ" pitchFamily="50" charset="-128"/>
+                  </a:endParaRPr>
                 </a:p>
               </p:txBody>
             </p:sp>
@@ -4562,7 +4570,7 @@
                     </a:spcBef>
                   </a:pPr>
                   <a:r>
-                    <a:rPr lang="en-US" altLang="ja-JP" dirty="0">
+                    <a:rPr lang="en-US" altLang="ja-JP" smtClean="0">
                       <a:solidFill>
                         <a:schemeClr val="tx1"/>
                       </a:solidFill>
@@ -4570,8 +4578,16 @@
                       <a:ea typeface="メイリオ" panose="020B0604030504040204" pitchFamily="50" charset="-128"/>
                       <a:cs typeface="メイリオ" pitchFamily="50" charset="-128"/>
                     </a:rPr>
-                    <a:t>REP_001</a:t>
+                    <a:t>REP_003</a:t>
                   </a:r>
+                  <a:endParaRPr lang="en-US" altLang="ja-JP" dirty="0">
+                    <a:solidFill>
+                      <a:schemeClr val="tx1"/>
+                    </a:solidFill>
+                    <a:latin typeface="メイリオ" panose="020B0604030504040204" pitchFamily="50" charset="-128"/>
+                    <a:ea typeface="メイリオ" panose="020B0604030504040204" pitchFamily="50" charset="-128"/>
+                    <a:cs typeface="メイリオ" pitchFamily="50" charset="-128"/>
+                  </a:endParaRPr>
                 </a:p>
               </p:txBody>
             </p:sp>
@@ -5623,7 +5639,7 @@
                       </a:spcBef>
                     </a:pPr>
                     <a:r>
-                      <a:rPr lang="en-US" altLang="ja-JP" dirty="0">
+                      <a:rPr lang="en-US" altLang="ja-JP" dirty="0" smtClean="0">
                         <a:solidFill>
                           <a:schemeClr val="tx1"/>
                         </a:solidFill>
@@ -5631,8 +5647,16 @@
                         <a:ea typeface="メイリオ" panose="020B0604030504040204" pitchFamily="50" charset="-128"/>
                         <a:cs typeface="メイリオ" pitchFamily="50" charset="-128"/>
                       </a:rPr>
-                      <a:t>REP_000</a:t>
+                      <a:t>REP_002</a:t>
                     </a:r>
+                    <a:endParaRPr lang="en-US" altLang="ja-JP" dirty="0">
+                      <a:solidFill>
+                        <a:schemeClr val="tx1"/>
+                      </a:solidFill>
+                      <a:latin typeface="メイリオ" panose="020B0604030504040204" pitchFamily="50" charset="-128"/>
+                      <a:ea typeface="メイリオ" panose="020B0604030504040204" pitchFamily="50" charset="-128"/>
+                      <a:cs typeface="メイリオ" pitchFamily="50" charset="-128"/>
+                    </a:endParaRPr>
                   </a:p>
                 </p:txBody>
               </p:sp>
@@ -5760,7 +5784,7 @@
                       </a:spcBef>
                     </a:pPr>
                     <a:r>
-                      <a:rPr lang="en-US" altLang="ja-JP" dirty="0">
+                      <a:rPr lang="en-US" altLang="ja-JP" dirty="0" smtClean="0">
                         <a:solidFill>
                           <a:schemeClr val="tx1"/>
                         </a:solidFill>
@@ -5768,8 +5792,16 @@
                         <a:ea typeface="メイリオ" panose="020B0604030504040204" pitchFamily="50" charset="-128"/>
                         <a:cs typeface="メイリオ" pitchFamily="50" charset="-128"/>
                       </a:rPr>
-                      <a:t>REP_001</a:t>
+                      <a:t>REP_003</a:t>
                     </a:r>
+                    <a:endParaRPr lang="en-US" altLang="ja-JP" dirty="0">
+                      <a:solidFill>
+                        <a:schemeClr val="tx1"/>
+                      </a:solidFill>
+                      <a:latin typeface="メイリオ" panose="020B0604030504040204" pitchFamily="50" charset="-128"/>
+                      <a:ea typeface="メイリオ" panose="020B0604030504040204" pitchFamily="50" charset="-128"/>
+                      <a:cs typeface="メイリオ" pitchFamily="50" charset="-128"/>
+                    </a:endParaRPr>
                   </a:p>
                 </p:txBody>
               </p:sp>

</xml_diff>